<commit_message>
Only to rewatch, finished
</commit_message>
<xml_diff>
--- a/advertising_presentation.pptx
+++ b/advertising_presentation.pptx
@@ -5,10 +5,10 @@
     <p:sldMasterId id="2147483648" r:id="rId1"/>
   </p:sldMasterIdLst>
   <p:notesMasterIdLst>
-    <p:notesMasterId r:id="rId21"/>
+    <p:notesMasterId r:id="rId24"/>
   </p:notesMasterIdLst>
   <p:handoutMasterIdLst>
-    <p:handoutMasterId r:id="rId22"/>
+    <p:handoutMasterId r:id="rId25"/>
   </p:handoutMasterIdLst>
   <p:sldIdLst>
     <p:sldId id="256" r:id="rId2"/>
@@ -30,6 +30,9 @@
     <p:sldId id="305" r:id="rId18"/>
     <p:sldId id="306" r:id="rId19"/>
     <p:sldId id="289" r:id="rId20"/>
+    <p:sldId id="307" r:id="rId21"/>
+    <p:sldId id="308" r:id="rId22"/>
+    <p:sldId id="309" r:id="rId23"/>
   </p:sldIdLst>
   <p:sldSz cx="9144000" cy="6858000" type="screen4x3"/>
   <p:notesSz cx="6669088" cy="9928225"/>
@@ -8206,7 +8209,7 @@
         </p:blipFill>
         <p:spPr>
           <a:xfrm>
-            <a:off x="719138" y="2132856"/>
+            <a:off x="337920" y="2529408"/>
             <a:ext cx="4109536" cy="3050578"/>
           </a:xfrm>
           <a:prstGeom prst="rect">
@@ -8236,7 +8239,7 @@
         </p:blipFill>
         <p:spPr>
           <a:xfrm>
-            <a:off x="4828674" y="2137887"/>
+            <a:off x="4427984" y="2529408"/>
             <a:ext cx="4109536" cy="3045547"/>
           </a:xfrm>
           <a:prstGeom prst="rect">
@@ -8258,7 +8261,7 @@
         </p:nvSpPr>
         <p:spPr>
           <a:xfrm>
-            <a:off x="971600" y="1456519"/>
+            <a:off x="590382" y="1853071"/>
             <a:ext cx="2582758" cy="369332"/>
           </a:xfrm>
           <a:prstGeom prst="rect">
@@ -8306,7 +8309,7 @@
         </p:nvSpPr>
         <p:spPr>
           <a:xfrm>
-            <a:off x="4932040" y="1456519"/>
+            <a:off x="4550822" y="1853071"/>
             <a:ext cx="2480166" cy="369332"/>
           </a:xfrm>
           <a:prstGeom prst="rect">
@@ -9959,7 +9962,7 @@
                   <a:srgbClr val="003F6E"/>
                 </a:solidFill>
               </a:rPr>
-              <a:t>CGPTS</a:t>
+              <a:t>Sub-campaign and curves definition</a:t>
             </a:r>
             <a:endParaRPr lang="en-GB" dirty="0">
               <a:solidFill>
@@ -9990,7 +9993,7 @@
                   <a:srgbClr val="003F6E"/>
                 </a:solidFill>
               </a:rPr>
-              <a:t>CGPTS vs CGTS</a:t>
+              <a:t>CGPTS </a:t>
             </a:r>
             <a:endParaRPr lang="en-GB" dirty="0">
               <a:solidFill>
@@ -10141,6 +10144,1353 @@
 </p:sld>
 </file>
 
+<file path=ppt/slides/slide20.xml><?xml version="1.0" encoding="utf-8"?>
+<p:sld xmlns:a="http://schemas.openxmlformats.org/drawingml/2006/main" xmlns:r="http://schemas.openxmlformats.org/officeDocument/2006/relationships" xmlns:p="http://schemas.openxmlformats.org/presentationml/2006/main">
+  <p:cSld>
+    <p:spTree>
+      <p:nvGrpSpPr>
+        <p:cNvPr id="1" name=""/>
+        <p:cNvGrpSpPr/>
+        <p:nvPr/>
+      </p:nvGrpSpPr>
+      <p:grpSpPr>
+        <a:xfrm>
+          <a:off x="0" y="0"/>
+          <a:ext cx="0" cy="0"/>
+          <a:chOff x="0" y="0"/>
+          <a:chExt cx="0" cy="0"/>
+        </a:xfrm>
+      </p:grpSpPr>
+      <p:sp>
+        <p:nvSpPr>
+          <p:cNvPr id="2" name="Titolo 1">
+            <a:extLst>
+              <a:ext uri="{FF2B5EF4-FFF2-40B4-BE49-F238E27FC236}">
+                <a16:creationId xmlns:a16="http://schemas.microsoft.com/office/drawing/2014/main" id="{FD35D058-FCB6-4EA3-9CD5-D810E547FE57}"/>
+              </a:ext>
+            </a:extLst>
+          </p:cNvPr>
+          <p:cNvSpPr>
+            <a:spLocks noGrp="1"/>
+          </p:cNvSpPr>
+          <p:nvPr>
+            <p:ph type="title"/>
+          </p:nvPr>
+        </p:nvSpPr>
+        <p:spPr>
+          <a:xfrm>
+            <a:off x="719138" y="260648"/>
+            <a:ext cx="6373142" cy="504056"/>
+          </a:xfrm>
+        </p:spPr>
+        <p:txBody>
+          <a:bodyPr/>
+          <a:lstStyle/>
+          <a:p>
+            <a:r>
+              <a:rPr lang="it-IT" dirty="0"/>
+              <a:t>CGP-TS </a:t>
+            </a:r>
+            <a:r>
+              <a:rPr lang="it-IT" dirty="0" err="1"/>
+              <a:t>disaggregation</a:t>
+            </a:r>
+            <a:r>
+              <a:rPr lang="it-IT" dirty="0"/>
+              <a:t>, </a:t>
+            </a:r>
+            <a:r>
+              <a:rPr lang="it-IT" dirty="0" err="1"/>
+              <a:t>context</a:t>
+            </a:r>
+            <a:r>
+              <a:rPr lang="it-IT" dirty="0"/>
+              <a:t> </a:t>
+            </a:r>
+            <a:r>
+              <a:rPr lang="it-IT" dirty="0" err="1"/>
+              <a:t>identification</a:t>
+            </a:r>
+            <a:endParaRPr lang="it-IT" dirty="0"/>
+          </a:p>
+        </p:txBody>
+      </p:sp>
+      <p:sp>
+        <p:nvSpPr>
+          <p:cNvPr id="3" name="Segnaposto contenuto 2">
+            <a:extLst>
+              <a:ext uri="{FF2B5EF4-FFF2-40B4-BE49-F238E27FC236}">
+                <a16:creationId xmlns:a16="http://schemas.microsoft.com/office/drawing/2014/main" id="{CE68D992-1BB1-434F-B73F-FD14EF3ED552}"/>
+              </a:ext>
+            </a:extLst>
+          </p:cNvPr>
+          <p:cNvSpPr>
+            <a:spLocks noGrp="1"/>
+          </p:cNvSpPr>
+          <p:nvPr>
+            <p:ph idx="1"/>
+          </p:nvPr>
+        </p:nvSpPr>
+        <p:spPr/>
+        <p:txBody>
+          <a:bodyPr/>
+          <a:lstStyle/>
+          <a:p>
+            <a:pPr>
+              <a:buFont typeface="Arial" panose="020B0604020202020204" pitchFamily="34" charset="0"/>
+              <a:buChar char="•"/>
+            </a:pPr>
+            <a:r>
+              <a:rPr lang="it-IT" dirty="0"/>
+              <a:t>Check </a:t>
+            </a:r>
+            <a:r>
+              <a:rPr lang="it-IT" dirty="0" err="1"/>
+              <a:t>whether</a:t>
+            </a:r>
+            <a:r>
+              <a:rPr lang="it-IT" dirty="0"/>
+              <a:t> </a:t>
+            </a:r>
+            <a:r>
+              <a:rPr lang="it-IT" dirty="0" err="1"/>
+              <a:t>at</a:t>
+            </a:r>
+            <a:r>
+              <a:rPr lang="it-IT" dirty="0"/>
+              <a:t> some point </a:t>
+            </a:r>
+            <a:r>
+              <a:rPr lang="it-IT" dirty="0" err="1"/>
+              <a:t>is</a:t>
+            </a:r>
+            <a:r>
+              <a:rPr lang="it-IT" dirty="0"/>
+              <a:t> </a:t>
+            </a:r>
+            <a:r>
+              <a:rPr lang="it-IT" dirty="0" err="1"/>
+              <a:t>better</a:t>
+            </a:r>
+            <a:r>
+              <a:rPr lang="it-IT" dirty="0"/>
+              <a:t> disaggregate the aggregate </a:t>
+            </a:r>
+            <a:r>
+              <a:rPr lang="it-IT" dirty="0" err="1"/>
+              <a:t>curves</a:t>
+            </a:r>
+            <a:r>
+              <a:rPr lang="it-IT" dirty="0"/>
+              <a:t> and so create a new sub-</a:t>
+            </a:r>
+            <a:r>
+              <a:rPr lang="it-IT" dirty="0" err="1"/>
+              <a:t>campaigns</a:t>
+            </a:r>
+            <a:r>
+              <a:rPr lang="it-IT" dirty="0"/>
+              <a:t> or not. </a:t>
+            </a:r>
+          </a:p>
+          <a:p>
+            <a:pPr>
+              <a:buFont typeface="Arial" panose="020B0604020202020204" pitchFamily="34" charset="0"/>
+              <a:buChar char="•"/>
+            </a:pPr>
+            <a:endParaRPr lang="it-IT" dirty="0"/>
+          </a:p>
+          <a:p>
+            <a:pPr>
+              <a:buFont typeface="Arial" panose="020B0604020202020204" pitchFamily="34" charset="0"/>
+              <a:buChar char="•"/>
+            </a:pPr>
+            <a:r>
+              <a:rPr lang="it-IT" dirty="0" err="1"/>
+              <a:t>Context</a:t>
+            </a:r>
+            <a:r>
+              <a:rPr lang="it-IT" dirty="0"/>
+              <a:t> </a:t>
+            </a:r>
+            <a:r>
+              <a:rPr lang="it-IT" dirty="0" err="1"/>
+              <a:t>identification</a:t>
+            </a:r>
+            <a:r>
+              <a:rPr lang="it-IT" dirty="0"/>
+              <a:t>: </a:t>
+            </a:r>
+            <a:r>
+              <a:rPr lang="it-IT" dirty="0" err="1"/>
+              <a:t>identifying</a:t>
+            </a:r>
+            <a:r>
+              <a:rPr lang="it-IT" dirty="0"/>
+              <a:t> from </a:t>
+            </a:r>
+            <a:r>
+              <a:rPr lang="it-IT" dirty="0" err="1"/>
+              <a:t>which</a:t>
+            </a:r>
+            <a:r>
+              <a:rPr lang="it-IT" dirty="0"/>
+              <a:t> class  the clicks come from.</a:t>
+            </a:r>
+          </a:p>
+          <a:p>
+            <a:pPr>
+              <a:buFont typeface="Arial" panose="020B0604020202020204" pitchFamily="34" charset="0"/>
+              <a:buChar char="•"/>
+            </a:pPr>
+            <a:endParaRPr lang="it-IT" dirty="0"/>
+          </a:p>
+          <a:p>
+            <a:pPr>
+              <a:buFont typeface="Arial" panose="020B0604020202020204" pitchFamily="34" charset="0"/>
+              <a:buChar char="•"/>
+            </a:pPr>
+            <a:r>
+              <a:rPr lang="it-IT" dirty="0"/>
+              <a:t>Learning in </a:t>
+            </a:r>
+            <a:r>
+              <a:rPr lang="it-IT" dirty="0" err="1"/>
+              <a:t>parallel</a:t>
+            </a:r>
+            <a:r>
+              <a:rPr lang="it-IT" dirty="0"/>
+              <a:t> </a:t>
+            </a:r>
+            <a:r>
+              <a:rPr lang="it-IT" dirty="0" err="1"/>
+              <a:t>other</a:t>
+            </a:r>
+            <a:r>
+              <a:rPr lang="it-IT" dirty="0"/>
+              <a:t> </a:t>
+            </a:r>
+            <a:r>
+              <a:rPr lang="it-IT" dirty="0" err="1"/>
+              <a:t>combinatorial</a:t>
+            </a:r>
+            <a:r>
+              <a:rPr lang="it-IT" dirty="0"/>
+              <a:t> GP-TS, </a:t>
+            </a:r>
+            <a:r>
+              <a:rPr lang="it-IT" dirty="0" err="1"/>
+              <a:t>consiering</a:t>
+            </a:r>
+            <a:r>
+              <a:rPr lang="it-IT" dirty="0"/>
+              <a:t> </a:t>
+            </a:r>
+            <a:r>
+              <a:rPr lang="it-IT" dirty="0" err="1"/>
+              <a:t>all</a:t>
+            </a:r>
+            <a:r>
+              <a:rPr lang="it-IT" dirty="0"/>
+              <a:t> the </a:t>
+            </a:r>
+            <a:r>
+              <a:rPr lang="it-IT" dirty="0" err="1"/>
+              <a:t>possible</a:t>
+            </a:r>
+            <a:r>
+              <a:rPr lang="it-IT" dirty="0"/>
+              <a:t> </a:t>
+            </a:r>
+            <a:r>
+              <a:rPr lang="it-IT" dirty="0" err="1"/>
+              <a:t>disaggregation</a:t>
+            </a:r>
+            <a:r>
+              <a:rPr lang="it-IT" dirty="0"/>
+              <a:t> </a:t>
+            </a:r>
+            <a:r>
+              <a:rPr lang="it-IT" dirty="0" err="1"/>
+              <a:t>combination</a:t>
+            </a:r>
+            <a:r>
+              <a:rPr lang="it-IT" dirty="0"/>
+              <a:t>:</a:t>
+            </a:r>
+          </a:p>
+          <a:p>
+            <a:pPr>
+              <a:buFont typeface="Arial" panose="020B0604020202020204" pitchFamily="34" charset="0"/>
+              <a:buChar char="•"/>
+            </a:pPr>
+            <a:endParaRPr lang="it-IT" dirty="0"/>
+          </a:p>
+          <a:p>
+            <a:pPr>
+              <a:buFont typeface="Arial" panose="020B0604020202020204" pitchFamily="34" charset="0"/>
+              <a:buChar char="•"/>
+            </a:pPr>
+            <a:r>
+              <a:rPr lang="it-IT" dirty="0" err="1"/>
+              <a:t>Example</a:t>
+            </a:r>
+            <a:r>
+              <a:rPr lang="it-IT" dirty="0"/>
+              <a:t>: (class1,class2,class3) or (class1+class2, class3) </a:t>
+            </a:r>
+            <a:r>
+              <a:rPr lang="it-IT" dirty="0" err="1"/>
+              <a:t>exc</a:t>
+            </a:r>
+            <a:r>
+              <a:rPr lang="it-IT" dirty="0"/>
+              <a:t>...</a:t>
+            </a:r>
+          </a:p>
+          <a:p>
+            <a:pPr>
+              <a:buFont typeface="Arial" panose="020B0604020202020204" pitchFamily="34" charset="0"/>
+              <a:buChar char="•"/>
+            </a:pPr>
+            <a:endParaRPr lang="it-IT" dirty="0"/>
+          </a:p>
+          <a:p>
+            <a:pPr>
+              <a:buFont typeface="Arial" panose="020B0604020202020204" pitchFamily="34" charset="0"/>
+              <a:buChar char="•"/>
+            </a:pPr>
+            <a:r>
+              <a:rPr lang="it-IT" dirty="0"/>
+              <a:t>First day of the week, check </a:t>
+            </a:r>
+            <a:r>
+              <a:rPr lang="it-IT" dirty="0" err="1"/>
+              <a:t>whether</a:t>
+            </a:r>
+            <a:r>
+              <a:rPr lang="it-IT" dirty="0"/>
+              <a:t> disaggregate or not, </a:t>
+            </a:r>
+            <a:r>
+              <a:rPr lang="it-IT" dirty="0" err="1"/>
+              <a:t>according</a:t>
+            </a:r>
+            <a:r>
+              <a:rPr lang="it-IT" dirty="0"/>
+              <a:t> to the </a:t>
+            </a:r>
+            <a:r>
+              <a:rPr lang="it-IT" dirty="0" err="1"/>
+              <a:t>expected</a:t>
+            </a:r>
+            <a:r>
+              <a:rPr lang="it-IT" dirty="0"/>
+              <a:t> </a:t>
+            </a:r>
+            <a:r>
+              <a:rPr lang="it-IT" dirty="0" err="1"/>
+              <a:t>reward</a:t>
+            </a:r>
+            <a:r>
+              <a:rPr lang="it-IT" dirty="0"/>
+              <a:t> of that </a:t>
+            </a:r>
+            <a:r>
+              <a:rPr lang="it-IT" dirty="0" err="1"/>
+              <a:t>combination</a:t>
+            </a:r>
+            <a:r>
+              <a:rPr lang="it-IT" dirty="0"/>
+              <a:t>, </a:t>
+            </a:r>
+            <a:r>
+              <a:rPr lang="it-IT" dirty="0" err="1"/>
+              <a:t>untill</a:t>
+            </a:r>
+            <a:r>
+              <a:rPr lang="it-IT" dirty="0"/>
+              <a:t> </a:t>
+            </a:r>
+            <a:r>
+              <a:rPr lang="it-IT" dirty="0" err="1"/>
+              <a:t>we</a:t>
+            </a:r>
+            <a:r>
+              <a:rPr lang="it-IT" dirty="0"/>
+              <a:t> </a:t>
+            </a:r>
+            <a:r>
+              <a:rPr lang="it-IT" dirty="0" err="1"/>
+              <a:t>have</a:t>
+            </a:r>
+            <a:r>
+              <a:rPr lang="it-IT" dirty="0"/>
+              <a:t> a complete </a:t>
+            </a:r>
+            <a:r>
+              <a:rPr lang="it-IT" dirty="0" err="1"/>
+              <a:t>disaggregation</a:t>
+            </a:r>
+            <a:r>
+              <a:rPr lang="it-IT" dirty="0"/>
+              <a:t>.</a:t>
+            </a:r>
+          </a:p>
+        </p:txBody>
+      </p:sp>
+      <p:sp>
+        <p:nvSpPr>
+          <p:cNvPr id="4" name="Segnaposto numero diapositiva 3">
+            <a:extLst>
+              <a:ext uri="{FF2B5EF4-FFF2-40B4-BE49-F238E27FC236}">
+                <a16:creationId xmlns:a16="http://schemas.microsoft.com/office/drawing/2014/main" id="{EBF1421E-69A0-470F-817C-D36FC096CAE9}"/>
+              </a:ext>
+            </a:extLst>
+          </p:cNvPr>
+          <p:cNvSpPr>
+            <a:spLocks noGrp="1"/>
+          </p:cNvSpPr>
+          <p:nvPr>
+            <p:ph type="sldNum" sz="quarter" idx="10"/>
+          </p:nvPr>
+        </p:nvSpPr>
+        <p:spPr/>
+        <p:txBody>
+          <a:bodyPr/>
+          <a:lstStyle/>
+          <a:p>
+            <a:fld id="{FE575B20-646B-44A6-B32B-8B9F7AC502D9}" type="slidenum">
+              <a:rPr lang="it-IT" altLang="en-US" smtClean="0"/>
+              <a:pPr/>
+              <a:t>20</a:t>
+            </a:fld>
+            <a:endParaRPr lang="it-IT" altLang="en-US" dirty="0"/>
+          </a:p>
+        </p:txBody>
+      </p:sp>
+      <p:sp>
+        <p:nvSpPr>
+          <p:cNvPr id="5" name="Rettangolo 4">
+            <a:extLst>
+              <a:ext uri="{FF2B5EF4-FFF2-40B4-BE49-F238E27FC236}">
+                <a16:creationId xmlns:a16="http://schemas.microsoft.com/office/drawing/2014/main" id="{7F1867F6-8042-4F60-A7CE-097CD3FE3F37}"/>
+              </a:ext>
+            </a:extLst>
+          </p:cNvPr>
+          <p:cNvSpPr/>
+          <p:nvPr/>
+        </p:nvSpPr>
+        <p:spPr bwMode="auto">
+          <a:xfrm>
+            <a:off x="719138" y="6613525"/>
+            <a:ext cx="4140894" cy="244475"/>
+          </a:xfrm>
+          <a:prstGeom prst="rect">
+            <a:avLst/>
+          </a:prstGeom>
+          <a:solidFill>
+            <a:schemeClr val="accent3"/>
+          </a:solidFill>
+          <a:ln>
+            <a:noFill/>
+          </a:ln>
+          <a:effectLst/>
+        </p:spPr>
+        <p:txBody>
+          <a:bodyPr vert="horz" wrap="square" lIns="0" tIns="0" rIns="0" bIns="0" numCol="1" rtlCol="0" anchor="t" anchorCtr="0" compatLnSpc="1">
+            <a:prstTxWarp prst="textNoShape">
+              <a:avLst/>
+            </a:prstTxWarp>
+          </a:bodyPr>
+          <a:lstStyle/>
+          <a:p>
+            <a:pPr marL="0" marR="0" indent="0" algn="ctr" defTabSz="914400" rtl="0" eaLnBrk="0" fontAlgn="base" latinLnBrk="0" hangingPunct="0">
+              <a:lnSpc>
+                <a:spcPct val="100000"/>
+              </a:lnSpc>
+              <a:spcBef>
+                <a:spcPct val="20000"/>
+              </a:spcBef>
+              <a:spcAft>
+                <a:spcPct val="0"/>
+              </a:spcAft>
+              <a:buClrTx/>
+              <a:buSzTx/>
+              <a:buFontTx/>
+              <a:buNone/>
+              <a:tabLst/>
+            </a:pPr>
+            <a:endParaRPr kumimoji="0" lang="it-IT" sz="2400" b="0" i="0" u="none" strike="noStrike" cap="none" normalizeH="0" baseline="0">
+              <a:ln>
+                <a:noFill/>
+              </a:ln>
+              <a:solidFill>
+                <a:schemeClr val="tx1"/>
+              </a:solidFill>
+              <a:effectLst/>
+              <a:latin typeface="Arial" panose="020B0604020202020204" pitchFamily="34" charset="0"/>
+            </a:endParaRPr>
+          </a:p>
+        </p:txBody>
+      </p:sp>
+    </p:spTree>
+    <p:extLst>
+      <p:ext uri="{BB962C8B-B14F-4D97-AF65-F5344CB8AC3E}">
+        <p14:creationId xmlns:p14="http://schemas.microsoft.com/office/powerpoint/2010/main" val="1792797123"/>
+      </p:ext>
+    </p:extLst>
+  </p:cSld>
+  <p:clrMapOvr>
+    <a:masterClrMapping/>
+  </p:clrMapOvr>
+</p:sld>
+</file>
+
+<file path=ppt/slides/slide21.xml><?xml version="1.0" encoding="utf-8"?>
+<p:sld xmlns:a="http://schemas.openxmlformats.org/drawingml/2006/main" xmlns:r="http://schemas.openxmlformats.org/officeDocument/2006/relationships" xmlns:p="http://schemas.openxmlformats.org/presentationml/2006/main">
+  <p:cSld>
+    <p:spTree>
+      <p:nvGrpSpPr>
+        <p:cNvPr id="1" name=""/>
+        <p:cNvGrpSpPr/>
+        <p:nvPr/>
+      </p:nvGrpSpPr>
+      <p:grpSpPr>
+        <a:xfrm>
+          <a:off x="0" y="0"/>
+          <a:ext cx="0" cy="0"/>
+          <a:chOff x="0" y="0"/>
+          <a:chExt cx="0" cy="0"/>
+        </a:xfrm>
+      </p:grpSpPr>
+      <p:sp>
+        <p:nvSpPr>
+          <p:cNvPr id="2" name="Titolo 1">
+            <a:extLst>
+              <a:ext uri="{FF2B5EF4-FFF2-40B4-BE49-F238E27FC236}">
+                <a16:creationId xmlns:a16="http://schemas.microsoft.com/office/drawing/2014/main" id="{28D7C9AC-B77E-46B5-BF5D-E3FD9345CE4A}"/>
+              </a:ext>
+            </a:extLst>
+          </p:cNvPr>
+          <p:cNvSpPr>
+            <a:spLocks noGrp="1"/>
+          </p:cNvSpPr>
+          <p:nvPr>
+            <p:ph type="title"/>
+          </p:nvPr>
+        </p:nvSpPr>
+        <p:spPr/>
+        <p:txBody>
+          <a:bodyPr/>
+          <a:lstStyle/>
+          <a:p>
+            <a:r>
+              <a:rPr lang="it-IT" dirty="0" err="1"/>
+              <a:t>Disaggregated</a:t>
+            </a:r>
+            <a:r>
+              <a:rPr lang="it-IT" dirty="0"/>
+              <a:t> CGP-TS settings e </a:t>
+            </a:r>
+            <a:r>
+              <a:rPr lang="it-IT" dirty="0" err="1"/>
+              <a:t>result</a:t>
+            </a:r>
+            <a:endParaRPr lang="it-IT" dirty="0"/>
+          </a:p>
+        </p:txBody>
+      </p:sp>
+      <p:sp>
+        <p:nvSpPr>
+          <p:cNvPr id="4" name="Segnaposto numero diapositiva 3">
+            <a:extLst>
+              <a:ext uri="{FF2B5EF4-FFF2-40B4-BE49-F238E27FC236}">
+                <a16:creationId xmlns:a16="http://schemas.microsoft.com/office/drawing/2014/main" id="{1F8A56B3-2B86-4E8F-A86D-A1CE03FF3188}"/>
+              </a:ext>
+            </a:extLst>
+          </p:cNvPr>
+          <p:cNvSpPr>
+            <a:spLocks noGrp="1"/>
+          </p:cNvSpPr>
+          <p:nvPr>
+            <p:ph type="sldNum" sz="quarter" idx="10"/>
+          </p:nvPr>
+        </p:nvSpPr>
+        <p:spPr/>
+        <p:txBody>
+          <a:bodyPr/>
+          <a:lstStyle/>
+          <a:p>
+            <a:fld id="{FE575B20-646B-44A6-B32B-8B9F7AC502D9}" type="slidenum">
+              <a:rPr lang="it-IT" altLang="en-US" smtClean="0"/>
+              <a:pPr/>
+              <a:t>21</a:t>
+            </a:fld>
+            <a:endParaRPr lang="it-IT" altLang="en-US" dirty="0"/>
+          </a:p>
+        </p:txBody>
+      </p:sp>
+      <p:pic>
+        <p:nvPicPr>
+          <p:cNvPr id="5" name="Immagine 4">
+            <a:extLst>
+              <a:ext uri="{FF2B5EF4-FFF2-40B4-BE49-F238E27FC236}">
+                <a16:creationId xmlns:a16="http://schemas.microsoft.com/office/drawing/2014/main" id="{2A919CF5-C294-4C42-99BE-E92D12345CFA}"/>
+              </a:ext>
+            </a:extLst>
+          </p:cNvPr>
+          <p:cNvPicPr>
+            <a:picLocks noChangeAspect="1"/>
+          </p:cNvPicPr>
+          <p:nvPr/>
+        </p:nvPicPr>
+        <p:blipFill>
+          <a:blip r:embed="rId2"/>
+          <a:stretch>
+            <a:fillRect/>
+          </a:stretch>
+        </p:blipFill>
+        <p:spPr>
+          <a:xfrm>
+            <a:off x="251520" y="1124744"/>
+            <a:ext cx="4456826" cy="5322540"/>
+          </a:xfrm>
+          <a:prstGeom prst="rect">
+            <a:avLst/>
+          </a:prstGeom>
+        </p:spPr>
+      </p:pic>
+      <p:sp>
+        <p:nvSpPr>
+          <p:cNvPr id="6" name="CasellaDiTesto 5">
+            <a:extLst>
+              <a:ext uri="{FF2B5EF4-FFF2-40B4-BE49-F238E27FC236}">
+                <a16:creationId xmlns:a16="http://schemas.microsoft.com/office/drawing/2014/main" id="{BD98833B-5A7C-499D-9EBB-EE05A9B6B340}"/>
+              </a:ext>
+            </a:extLst>
+          </p:cNvPr>
+          <p:cNvSpPr txBox="1"/>
+          <p:nvPr/>
+        </p:nvSpPr>
+        <p:spPr>
+          <a:xfrm>
+            <a:off x="4864824" y="1124744"/>
+            <a:ext cx="3523600" cy="2653034"/>
+          </a:xfrm>
+          <a:prstGeom prst="rect">
+            <a:avLst/>
+          </a:prstGeom>
+          <a:noFill/>
+        </p:spPr>
+        <p:txBody>
+          <a:bodyPr wrap="square" rtlCol="0">
+            <a:spAutoFit/>
+          </a:bodyPr>
+          <a:lstStyle/>
+          <a:p>
+            <a:pPr marL="285750" indent="-285750" algn="l">
+              <a:buFont typeface="Arial" panose="020B0604020202020204" pitchFamily="34" charset="0"/>
+              <a:buChar char="•"/>
+            </a:pPr>
+            <a:r>
+              <a:rPr lang="it-IT" sz="1600" dirty="0" err="1"/>
+              <a:t>Given</a:t>
+            </a:r>
+            <a:r>
+              <a:rPr lang="it-IT" sz="1600" dirty="0"/>
+              <a:t> </a:t>
+            </a:r>
+            <a:r>
+              <a:rPr lang="it-IT" sz="1600" dirty="0" err="1"/>
+              <a:t>those</a:t>
+            </a:r>
+            <a:r>
+              <a:rPr lang="it-IT" sz="1600" dirty="0"/>
+              <a:t> settings and for </a:t>
+            </a:r>
+            <a:r>
+              <a:rPr lang="it-IT" sz="1600" dirty="0" err="1"/>
+              <a:t>computational</a:t>
+            </a:r>
+            <a:r>
+              <a:rPr lang="it-IT" sz="1600" dirty="0"/>
+              <a:t> </a:t>
+            </a:r>
+            <a:r>
+              <a:rPr lang="it-IT" sz="1600" dirty="0" err="1"/>
+              <a:t>reason</a:t>
+            </a:r>
+            <a:r>
+              <a:rPr lang="it-IT" sz="1600" dirty="0"/>
+              <a:t> </a:t>
+            </a:r>
+            <a:r>
+              <a:rPr lang="it-IT" sz="1600" dirty="0" err="1"/>
+              <a:t>we</a:t>
+            </a:r>
+            <a:r>
+              <a:rPr lang="it-IT" sz="1600" dirty="0"/>
+              <a:t> </a:t>
+            </a:r>
+            <a:r>
+              <a:rPr lang="it-IT" sz="1600" dirty="0" err="1"/>
+              <a:t>have</a:t>
+            </a:r>
+            <a:r>
+              <a:rPr lang="it-IT" sz="1600" dirty="0"/>
+              <a:t> </a:t>
+            </a:r>
+            <a:r>
+              <a:rPr lang="it-IT" sz="1600" dirty="0" err="1"/>
+              <a:t>decided</a:t>
+            </a:r>
+            <a:r>
+              <a:rPr lang="it-IT" sz="1600" dirty="0"/>
+              <a:t> to </a:t>
+            </a:r>
+            <a:r>
+              <a:rPr lang="it-IT" sz="1600" dirty="0" err="1"/>
+              <a:t>analize</a:t>
+            </a:r>
+            <a:r>
+              <a:rPr lang="it-IT" sz="1600" dirty="0"/>
+              <a:t> </a:t>
+            </a:r>
+            <a:r>
+              <a:rPr lang="it-IT" sz="1600" u="sng" dirty="0" err="1"/>
+              <a:t>only</a:t>
+            </a:r>
+            <a:r>
+              <a:rPr lang="it-IT" sz="1600" dirty="0"/>
+              <a:t> the first sub-</a:t>
+            </a:r>
+            <a:r>
+              <a:rPr lang="it-IT" sz="1600" dirty="0" err="1"/>
+              <a:t>campaign</a:t>
+            </a:r>
+            <a:r>
+              <a:rPr lang="it-IT" sz="1600" dirty="0"/>
+              <a:t>, Google.</a:t>
+            </a:r>
+          </a:p>
+          <a:p>
+            <a:pPr marL="285750" indent="-285750" algn="l">
+              <a:buFont typeface="Arial" panose="020B0604020202020204" pitchFamily="34" charset="0"/>
+              <a:buChar char="•"/>
+            </a:pPr>
+            <a:endParaRPr lang="it-IT" sz="1600" dirty="0"/>
+          </a:p>
+          <a:p>
+            <a:pPr marL="285750" indent="-285750" algn="l">
+              <a:buFont typeface="Arial" panose="020B0604020202020204" pitchFamily="34" charset="0"/>
+              <a:buChar char="•"/>
+            </a:pPr>
+            <a:r>
+              <a:rPr lang="it-IT" sz="1600" dirty="0"/>
+              <a:t>The </a:t>
+            </a:r>
+            <a:r>
+              <a:rPr lang="it-IT" sz="1600" dirty="0" err="1"/>
+              <a:t>algorithm</a:t>
+            </a:r>
+            <a:r>
+              <a:rPr lang="it-IT" sz="1600" dirty="0"/>
+              <a:t> </a:t>
+            </a:r>
+            <a:r>
+              <a:rPr lang="it-IT" sz="1600" dirty="0" err="1"/>
+              <a:t>has</a:t>
+            </a:r>
+            <a:r>
+              <a:rPr lang="it-IT" sz="1600" dirty="0"/>
+              <a:t> </a:t>
+            </a:r>
+            <a:r>
+              <a:rPr lang="it-IT" sz="1600" dirty="0" err="1"/>
+              <a:t>choosen</a:t>
+            </a:r>
+            <a:r>
+              <a:rPr lang="it-IT" sz="1600" dirty="0"/>
+              <a:t> in </a:t>
+            </a:r>
+            <a:r>
+              <a:rPr lang="it-IT" sz="1600" dirty="0" err="1"/>
+              <a:t>average</a:t>
+            </a:r>
+            <a:r>
+              <a:rPr lang="it-IT" sz="1600" dirty="0"/>
+              <a:t> to disaggregate the first time </a:t>
+            </a:r>
+            <a:r>
+              <a:rPr lang="it-IT" sz="1600" dirty="0" err="1"/>
+              <a:t>around</a:t>
+            </a:r>
+            <a:r>
+              <a:rPr lang="it-IT" sz="1600" dirty="0"/>
+              <a:t> the 14</a:t>
+            </a:r>
+            <a:r>
+              <a:rPr lang="it-IT" sz="1600" baseline="30000" dirty="0"/>
+              <a:t>th </a:t>
+            </a:r>
+            <a:r>
+              <a:rPr lang="it-IT" sz="1600" dirty="0"/>
+              <a:t>and the 21</a:t>
+            </a:r>
+            <a:r>
+              <a:rPr lang="it-IT" sz="1600" baseline="30000" dirty="0"/>
+              <a:t>th </a:t>
+            </a:r>
+            <a:r>
+              <a:rPr lang="it-IT" sz="1600" dirty="0"/>
+              <a:t>day, and the second time </a:t>
+            </a:r>
+            <a:r>
+              <a:rPr lang="it-IT" sz="1600" dirty="0" err="1"/>
+              <a:t>around</a:t>
+            </a:r>
+            <a:r>
+              <a:rPr lang="it-IT" sz="1600" dirty="0"/>
+              <a:t> the 28</a:t>
+            </a:r>
+            <a:r>
+              <a:rPr lang="it-IT" sz="1600" baseline="30000" dirty="0"/>
+              <a:t>th</a:t>
+            </a:r>
+            <a:r>
+              <a:rPr lang="it-IT" sz="1600" dirty="0"/>
+              <a:t> and 42</a:t>
+            </a:r>
+            <a:r>
+              <a:rPr lang="it-IT" sz="1600" baseline="30000" dirty="0"/>
+              <a:t>th</a:t>
+            </a:r>
+            <a:r>
+              <a:rPr lang="it-IT" sz="1600" dirty="0"/>
+              <a:t> day.</a:t>
+            </a:r>
+          </a:p>
+        </p:txBody>
+      </p:sp>
+      <p:sp>
+        <p:nvSpPr>
+          <p:cNvPr id="7" name="Rettangolo 6">
+            <a:extLst>
+              <a:ext uri="{FF2B5EF4-FFF2-40B4-BE49-F238E27FC236}">
+                <a16:creationId xmlns:a16="http://schemas.microsoft.com/office/drawing/2014/main" id="{ED22DFD8-4E2B-490F-9412-E9791E9CE503}"/>
+              </a:ext>
+            </a:extLst>
+          </p:cNvPr>
+          <p:cNvSpPr/>
+          <p:nvPr/>
+        </p:nvSpPr>
+        <p:spPr bwMode="auto">
+          <a:xfrm>
+            <a:off x="719138" y="6613525"/>
+            <a:ext cx="4140894" cy="244475"/>
+          </a:xfrm>
+          <a:prstGeom prst="rect">
+            <a:avLst/>
+          </a:prstGeom>
+          <a:solidFill>
+            <a:schemeClr val="accent3"/>
+          </a:solidFill>
+          <a:ln>
+            <a:noFill/>
+          </a:ln>
+          <a:effectLst/>
+        </p:spPr>
+        <p:txBody>
+          <a:bodyPr vert="horz" wrap="square" lIns="0" tIns="0" rIns="0" bIns="0" numCol="1" rtlCol="0" anchor="t" anchorCtr="0" compatLnSpc="1">
+            <a:prstTxWarp prst="textNoShape">
+              <a:avLst/>
+            </a:prstTxWarp>
+          </a:bodyPr>
+          <a:lstStyle/>
+          <a:p>
+            <a:pPr marL="0" marR="0" indent="0" algn="ctr" defTabSz="914400" rtl="0" eaLnBrk="0" fontAlgn="base" latinLnBrk="0" hangingPunct="0">
+              <a:lnSpc>
+                <a:spcPct val="100000"/>
+              </a:lnSpc>
+              <a:spcBef>
+                <a:spcPct val="20000"/>
+              </a:spcBef>
+              <a:spcAft>
+                <a:spcPct val="0"/>
+              </a:spcAft>
+              <a:buClrTx/>
+              <a:buSzTx/>
+              <a:buFontTx/>
+              <a:buNone/>
+              <a:tabLst/>
+            </a:pPr>
+            <a:endParaRPr kumimoji="0" lang="it-IT" sz="2400" b="0" i="0" u="none" strike="noStrike" cap="none" normalizeH="0" baseline="0">
+              <a:ln>
+                <a:noFill/>
+              </a:ln>
+              <a:solidFill>
+                <a:schemeClr val="tx1"/>
+              </a:solidFill>
+              <a:effectLst/>
+              <a:latin typeface="Arial" panose="020B0604020202020204" pitchFamily="34" charset="0"/>
+            </a:endParaRPr>
+          </a:p>
+        </p:txBody>
+      </p:sp>
+      <p:pic>
+        <p:nvPicPr>
+          <p:cNvPr id="8" name="Immagine 7">
+            <a:extLst>
+              <a:ext uri="{FF2B5EF4-FFF2-40B4-BE49-F238E27FC236}">
+                <a16:creationId xmlns:a16="http://schemas.microsoft.com/office/drawing/2014/main" id="{754B267E-0F50-4A10-89AD-CD0368FF63EC}"/>
+              </a:ext>
+            </a:extLst>
+          </p:cNvPr>
+          <p:cNvPicPr>
+            <a:picLocks noChangeAspect="1"/>
+          </p:cNvPicPr>
+          <p:nvPr/>
+        </p:nvPicPr>
+        <p:blipFill>
+          <a:blip r:embed="rId3"/>
+          <a:stretch>
+            <a:fillRect/>
+          </a:stretch>
+        </p:blipFill>
+        <p:spPr>
+          <a:xfrm>
+            <a:off x="5867510" y="3933056"/>
+            <a:ext cx="1518227" cy="2204307"/>
+          </a:xfrm>
+          <a:prstGeom prst="rect">
+            <a:avLst/>
+          </a:prstGeom>
+        </p:spPr>
+      </p:pic>
+    </p:spTree>
+    <p:extLst>
+      <p:ext uri="{BB962C8B-B14F-4D97-AF65-F5344CB8AC3E}">
+        <p14:creationId xmlns:p14="http://schemas.microsoft.com/office/powerpoint/2010/main" val="3604182515"/>
+      </p:ext>
+    </p:extLst>
+  </p:cSld>
+  <p:clrMapOvr>
+    <a:masterClrMapping/>
+  </p:clrMapOvr>
+</p:sld>
+</file>
+
+<file path=ppt/slides/slide22.xml><?xml version="1.0" encoding="utf-8"?>
+<p:sld xmlns:a="http://schemas.openxmlformats.org/drawingml/2006/main" xmlns:r="http://schemas.openxmlformats.org/officeDocument/2006/relationships" xmlns:p="http://schemas.openxmlformats.org/presentationml/2006/main">
+  <p:cSld>
+    <p:spTree>
+      <p:nvGrpSpPr>
+        <p:cNvPr id="1" name=""/>
+        <p:cNvGrpSpPr/>
+        <p:nvPr/>
+      </p:nvGrpSpPr>
+      <p:grpSpPr>
+        <a:xfrm>
+          <a:off x="0" y="0"/>
+          <a:ext cx="0" cy="0"/>
+          <a:chOff x="0" y="0"/>
+          <a:chExt cx="0" cy="0"/>
+        </a:xfrm>
+      </p:grpSpPr>
+      <p:sp>
+        <p:nvSpPr>
+          <p:cNvPr id="2" name="Titolo 1">
+            <a:extLst>
+              <a:ext uri="{FF2B5EF4-FFF2-40B4-BE49-F238E27FC236}">
+                <a16:creationId xmlns:a16="http://schemas.microsoft.com/office/drawing/2014/main" id="{B60A732B-C642-4BF1-A57B-3418AC3AC616}"/>
+              </a:ext>
+            </a:extLst>
+          </p:cNvPr>
+          <p:cNvSpPr>
+            <a:spLocks noGrp="1"/>
+          </p:cNvSpPr>
+          <p:nvPr>
+            <p:ph type="title"/>
+          </p:nvPr>
+        </p:nvSpPr>
+        <p:spPr/>
+        <p:txBody>
+          <a:bodyPr/>
+          <a:lstStyle/>
+          <a:p>
+            <a:r>
+              <a:rPr lang="it-IT" dirty="0" err="1"/>
+              <a:t>Disaggregated</a:t>
+            </a:r>
+            <a:r>
+              <a:rPr lang="it-IT" dirty="0"/>
+              <a:t> CGP-TS performance </a:t>
+            </a:r>
+            <a:r>
+              <a:rPr lang="it-IT" dirty="0" err="1"/>
+              <a:t>graphs</a:t>
+            </a:r>
+            <a:endParaRPr lang="it-IT" dirty="0"/>
+          </a:p>
+        </p:txBody>
+      </p:sp>
+      <p:sp>
+        <p:nvSpPr>
+          <p:cNvPr id="4" name="Segnaposto numero diapositiva 3">
+            <a:extLst>
+              <a:ext uri="{FF2B5EF4-FFF2-40B4-BE49-F238E27FC236}">
+                <a16:creationId xmlns:a16="http://schemas.microsoft.com/office/drawing/2014/main" id="{2D960EA3-52B7-4BC9-AC3B-364425E6DD70}"/>
+              </a:ext>
+            </a:extLst>
+          </p:cNvPr>
+          <p:cNvSpPr>
+            <a:spLocks noGrp="1"/>
+          </p:cNvSpPr>
+          <p:nvPr>
+            <p:ph type="sldNum" sz="quarter" idx="10"/>
+          </p:nvPr>
+        </p:nvSpPr>
+        <p:spPr/>
+        <p:txBody>
+          <a:bodyPr/>
+          <a:lstStyle/>
+          <a:p>
+            <a:fld id="{FE575B20-646B-44A6-B32B-8B9F7AC502D9}" type="slidenum">
+              <a:rPr lang="it-IT" altLang="en-US" smtClean="0"/>
+              <a:pPr/>
+              <a:t>22</a:t>
+            </a:fld>
+            <a:endParaRPr lang="it-IT" altLang="en-US" dirty="0"/>
+          </a:p>
+        </p:txBody>
+      </p:sp>
+      <p:pic>
+        <p:nvPicPr>
+          <p:cNvPr id="5" name="Immagine 4">
+            <a:extLst>
+              <a:ext uri="{FF2B5EF4-FFF2-40B4-BE49-F238E27FC236}">
+                <a16:creationId xmlns:a16="http://schemas.microsoft.com/office/drawing/2014/main" id="{3A596B5F-7754-4954-87F3-D24E37F3619F}"/>
+              </a:ext>
+            </a:extLst>
+          </p:cNvPr>
+          <p:cNvPicPr>
+            <a:picLocks noChangeAspect="1"/>
+          </p:cNvPicPr>
+          <p:nvPr/>
+        </p:nvPicPr>
+        <p:blipFill>
+          <a:blip r:embed="rId2"/>
+          <a:stretch>
+            <a:fillRect/>
+          </a:stretch>
+        </p:blipFill>
+        <p:spPr>
+          <a:xfrm>
+            <a:off x="137016" y="3284984"/>
+            <a:ext cx="4202163" cy="3115777"/>
+          </a:xfrm>
+          <a:prstGeom prst="rect">
+            <a:avLst/>
+          </a:prstGeom>
+        </p:spPr>
+      </p:pic>
+      <p:sp>
+        <p:nvSpPr>
+          <p:cNvPr id="6" name="Rettangolo 5">
+            <a:extLst>
+              <a:ext uri="{FF2B5EF4-FFF2-40B4-BE49-F238E27FC236}">
+                <a16:creationId xmlns:a16="http://schemas.microsoft.com/office/drawing/2014/main" id="{FE83BFC8-D562-41E6-B6A9-8BF87CE737CE}"/>
+              </a:ext>
+            </a:extLst>
+          </p:cNvPr>
+          <p:cNvSpPr/>
+          <p:nvPr/>
+        </p:nvSpPr>
+        <p:spPr bwMode="auto">
+          <a:xfrm>
+            <a:off x="719138" y="6613525"/>
+            <a:ext cx="4140894" cy="244475"/>
+          </a:xfrm>
+          <a:prstGeom prst="rect">
+            <a:avLst/>
+          </a:prstGeom>
+          <a:solidFill>
+            <a:schemeClr val="accent3"/>
+          </a:solidFill>
+          <a:ln>
+            <a:noFill/>
+          </a:ln>
+          <a:effectLst/>
+        </p:spPr>
+        <p:txBody>
+          <a:bodyPr vert="horz" wrap="square" lIns="0" tIns="0" rIns="0" bIns="0" numCol="1" rtlCol="0" anchor="t" anchorCtr="0" compatLnSpc="1">
+            <a:prstTxWarp prst="textNoShape">
+              <a:avLst/>
+            </a:prstTxWarp>
+          </a:bodyPr>
+          <a:lstStyle/>
+          <a:p>
+            <a:pPr marL="0" marR="0" indent="0" algn="ctr" defTabSz="914400" rtl="0" eaLnBrk="0" fontAlgn="base" latinLnBrk="0" hangingPunct="0">
+              <a:lnSpc>
+                <a:spcPct val="100000"/>
+              </a:lnSpc>
+              <a:spcBef>
+                <a:spcPct val="20000"/>
+              </a:spcBef>
+              <a:spcAft>
+                <a:spcPct val="0"/>
+              </a:spcAft>
+              <a:buClrTx/>
+              <a:buSzTx/>
+              <a:buFontTx/>
+              <a:buNone/>
+              <a:tabLst/>
+            </a:pPr>
+            <a:endParaRPr kumimoji="0" lang="it-IT" sz="2400" b="0" i="0" u="none" strike="noStrike" cap="none" normalizeH="0" baseline="0">
+              <a:ln>
+                <a:noFill/>
+              </a:ln>
+              <a:solidFill>
+                <a:schemeClr val="tx1"/>
+              </a:solidFill>
+              <a:effectLst/>
+              <a:latin typeface="Arial" panose="020B0604020202020204" pitchFamily="34" charset="0"/>
+            </a:endParaRPr>
+          </a:p>
+        </p:txBody>
+      </p:sp>
+      <p:pic>
+        <p:nvPicPr>
+          <p:cNvPr id="7" name="Immagine 6">
+            <a:extLst>
+              <a:ext uri="{FF2B5EF4-FFF2-40B4-BE49-F238E27FC236}">
+                <a16:creationId xmlns:a16="http://schemas.microsoft.com/office/drawing/2014/main" id="{6B174539-025E-4517-B141-34C107279DDA}"/>
+              </a:ext>
+            </a:extLst>
+          </p:cNvPr>
+          <p:cNvPicPr>
+            <a:picLocks noChangeAspect="1"/>
+          </p:cNvPicPr>
+          <p:nvPr/>
+        </p:nvPicPr>
+        <p:blipFill>
+          <a:blip r:embed="rId3"/>
+          <a:stretch>
+            <a:fillRect/>
+          </a:stretch>
+        </p:blipFill>
+        <p:spPr>
+          <a:xfrm>
+            <a:off x="4613851" y="3284985"/>
+            <a:ext cx="4178885" cy="3115776"/>
+          </a:xfrm>
+          <a:prstGeom prst="rect">
+            <a:avLst/>
+          </a:prstGeom>
+        </p:spPr>
+      </p:pic>
+      <p:sp>
+        <p:nvSpPr>
+          <p:cNvPr id="8" name="CasellaDiTesto 7">
+            <a:extLst>
+              <a:ext uri="{FF2B5EF4-FFF2-40B4-BE49-F238E27FC236}">
+                <a16:creationId xmlns:a16="http://schemas.microsoft.com/office/drawing/2014/main" id="{671B87BA-17DB-4921-B396-A49469F5DF2B}"/>
+              </a:ext>
+            </a:extLst>
+          </p:cNvPr>
+          <p:cNvSpPr txBox="1"/>
+          <p:nvPr/>
+        </p:nvSpPr>
+        <p:spPr>
+          <a:xfrm>
+            <a:off x="451129" y="2669901"/>
+            <a:ext cx="2582758" cy="369332"/>
+          </a:xfrm>
+          <a:prstGeom prst="rect">
+            <a:avLst/>
+          </a:prstGeom>
+          <a:noFill/>
+        </p:spPr>
+        <p:txBody>
+          <a:bodyPr wrap="none" rtlCol="0">
+            <a:spAutoFit/>
+          </a:bodyPr>
+          <a:lstStyle/>
+          <a:p>
+            <a:pPr marL="342900" indent="-342900" algn="l">
+              <a:buFont typeface="Arial" panose="020B0604020202020204" pitchFamily="34" charset="0"/>
+              <a:buChar char="•"/>
+            </a:pPr>
+            <a:r>
+              <a:rPr lang="it-IT" sz="1800" dirty="0" err="1"/>
+              <a:t>Reward</a:t>
+            </a:r>
+            <a:r>
+              <a:rPr lang="it-IT" sz="1800" dirty="0"/>
+              <a:t> </a:t>
+            </a:r>
+            <a:r>
+              <a:rPr lang="it-IT" sz="1800" dirty="0" err="1"/>
+              <a:t>comparison</a:t>
+            </a:r>
+            <a:endParaRPr lang="it-IT" sz="1800" dirty="0"/>
+          </a:p>
+        </p:txBody>
+      </p:sp>
+      <p:sp>
+        <p:nvSpPr>
+          <p:cNvPr id="9" name="CasellaDiTesto 8">
+            <a:extLst>
+              <a:ext uri="{FF2B5EF4-FFF2-40B4-BE49-F238E27FC236}">
+                <a16:creationId xmlns:a16="http://schemas.microsoft.com/office/drawing/2014/main" id="{D1D0CD37-C13D-46A7-BD59-0F10B4B93873}"/>
+              </a:ext>
+            </a:extLst>
+          </p:cNvPr>
+          <p:cNvSpPr txBox="1"/>
+          <p:nvPr/>
+        </p:nvSpPr>
+        <p:spPr>
+          <a:xfrm>
+            <a:off x="4843617" y="2669901"/>
+            <a:ext cx="2480166" cy="369332"/>
+          </a:xfrm>
+          <a:prstGeom prst="rect">
+            <a:avLst/>
+          </a:prstGeom>
+          <a:noFill/>
+        </p:spPr>
+        <p:txBody>
+          <a:bodyPr wrap="none" rtlCol="0">
+            <a:spAutoFit/>
+          </a:bodyPr>
+          <a:lstStyle/>
+          <a:p>
+            <a:pPr marL="342900" indent="-342900" algn="l">
+              <a:buFont typeface="Arial" panose="020B0604020202020204" pitchFamily="34" charset="0"/>
+              <a:buChar char="•"/>
+            </a:pPr>
+            <a:r>
+              <a:rPr lang="it-IT" sz="1800" dirty="0" err="1"/>
+              <a:t>Regret</a:t>
+            </a:r>
+            <a:r>
+              <a:rPr lang="it-IT" sz="1800" dirty="0"/>
+              <a:t> </a:t>
+            </a:r>
+            <a:r>
+              <a:rPr lang="it-IT" sz="1800" dirty="0" err="1"/>
+              <a:t>comparison</a:t>
+            </a:r>
+            <a:endParaRPr lang="it-IT" sz="1800" dirty="0"/>
+          </a:p>
+        </p:txBody>
+      </p:sp>
+      <p:sp>
+        <p:nvSpPr>
+          <p:cNvPr id="10" name="CasellaDiTesto 9">
+            <a:extLst>
+              <a:ext uri="{FF2B5EF4-FFF2-40B4-BE49-F238E27FC236}">
+                <a16:creationId xmlns:a16="http://schemas.microsoft.com/office/drawing/2014/main" id="{13BCA9D0-DBAA-4F26-86F2-0CD92874124F}"/>
+              </a:ext>
+            </a:extLst>
+          </p:cNvPr>
+          <p:cNvSpPr txBox="1"/>
+          <p:nvPr/>
+        </p:nvSpPr>
+        <p:spPr>
+          <a:xfrm>
+            <a:off x="688362" y="1268760"/>
+            <a:ext cx="5525872" cy="1034129"/>
+          </a:xfrm>
+          <a:prstGeom prst="rect">
+            <a:avLst/>
+          </a:prstGeom>
+          <a:noFill/>
+        </p:spPr>
+        <p:txBody>
+          <a:bodyPr wrap="none" rtlCol="0">
+            <a:spAutoFit/>
+          </a:bodyPr>
+          <a:lstStyle/>
+          <a:p>
+            <a:pPr marL="285750" indent="-285750" algn="l">
+              <a:buFont typeface="Arial" panose="020B0604020202020204" pitchFamily="34" charset="0"/>
+              <a:buChar char="•"/>
+            </a:pPr>
+            <a:r>
+              <a:rPr lang="it-IT" sz="1800" dirty="0"/>
+              <a:t>Maximum </a:t>
+            </a:r>
+            <a:r>
+              <a:rPr lang="it-IT" sz="1800" dirty="0" err="1"/>
+              <a:t>Clairvoyant</a:t>
+            </a:r>
+            <a:r>
+              <a:rPr lang="it-IT" sz="1800" dirty="0"/>
+              <a:t> </a:t>
+            </a:r>
+            <a:r>
+              <a:rPr lang="it-IT" sz="1800" dirty="0" err="1"/>
+              <a:t>algorithm</a:t>
+            </a:r>
+            <a:r>
+              <a:rPr lang="it-IT" sz="1800" dirty="0"/>
+              <a:t> </a:t>
+            </a:r>
+            <a:r>
+              <a:rPr lang="it-IT" sz="1800" dirty="0" err="1"/>
+              <a:t>value</a:t>
+            </a:r>
+            <a:r>
+              <a:rPr lang="it-IT" sz="1800" dirty="0"/>
+              <a:t> : 183 clicks</a:t>
+            </a:r>
+          </a:p>
+          <a:p>
+            <a:pPr marL="285750" indent="-285750" algn="l">
+              <a:buFont typeface="Arial" panose="020B0604020202020204" pitchFamily="34" charset="0"/>
+              <a:buChar char="•"/>
+            </a:pPr>
+            <a:endParaRPr lang="it-IT" sz="1800" dirty="0"/>
+          </a:p>
+          <a:p>
+            <a:pPr marL="285750" indent="-285750" algn="l">
+              <a:buFont typeface="Arial" panose="020B0604020202020204" pitchFamily="34" charset="0"/>
+              <a:buChar char="•"/>
+            </a:pPr>
+            <a:r>
+              <a:rPr lang="it-IT" sz="1800" dirty="0" err="1"/>
+              <a:t>Avg</a:t>
+            </a:r>
+            <a:r>
+              <a:rPr lang="it-IT" sz="1800" dirty="0"/>
+              <a:t> </a:t>
+            </a:r>
+            <a:r>
+              <a:rPr lang="it-IT" sz="1800" dirty="0" err="1"/>
+              <a:t>values</a:t>
+            </a:r>
+            <a:r>
+              <a:rPr lang="it-IT" sz="1800" dirty="0"/>
+              <a:t> : ~143 clicks vs ~ 170 clicks</a:t>
+            </a:r>
+          </a:p>
+        </p:txBody>
+      </p:sp>
+    </p:spTree>
+    <p:extLst>
+      <p:ext uri="{BB962C8B-B14F-4D97-AF65-F5344CB8AC3E}">
+        <p14:creationId xmlns:p14="http://schemas.microsoft.com/office/powerpoint/2010/main" val="3572441266"/>
+      </p:ext>
+    </p:extLst>
+  </p:cSld>
+  <p:clrMapOvr>
+    <a:masterClrMapping/>
+  </p:clrMapOvr>
+</p:sld>
+</file>
+
 <file path=ppt/slides/slide3.xml><?xml version="1.0" encoding="utf-8"?>
 <p:sld xmlns:a="http://schemas.openxmlformats.org/drawingml/2006/main" xmlns:r="http://schemas.openxmlformats.org/officeDocument/2006/relationships" xmlns:p="http://schemas.openxmlformats.org/presentationml/2006/main">
   <p:cSld>
@@ -10269,14 +11619,14 @@
               <a:buChar char="•"/>
             </a:pPr>
             <a:r>
-              <a:rPr lang="en-GB" sz="1200" i="1" dirty="0">
+              <a:rPr lang="en-GB" sz="1800" i="1" dirty="0">
                 <a:latin typeface="Arial" panose="020B0604020202020204" pitchFamily="34" charset="0"/>
                 <a:cs typeface="Arial" panose="020B0604020202020204" pitchFamily="34" charset="0"/>
               </a:rPr>
               <a:t>Voice interaction, music playback, making to-do lists, setting alarms, streaming podcasts, in addition to providing weather, traffic and other real-time information</a:t>
             </a:r>
             <a:r>
-              <a:rPr lang="en-GB" sz="1200" i="1" dirty="0">
+              <a:rPr lang="en-GB" sz="1800" i="1" dirty="0">
                 <a:solidFill>
                   <a:srgbClr val="003F6E"/>
                 </a:solidFill>
@@ -10301,7 +11651,7 @@
               <a:buChar char="•"/>
             </a:pPr>
             <a:r>
-              <a:rPr lang="en-GB" sz="1200" i="1" dirty="0">
+              <a:rPr lang="en-GB" sz="1800" i="1" dirty="0">
                 <a:latin typeface="Arial"/>
                 <a:cs typeface="Arial"/>
               </a:rPr>

</xml_diff>